<commit_message>
update idk what i've done
</commit_message>
<xml_diff>
--- a/documents/draft presentation.pptx
+++ b/documents/draft presentation.pptx
@@ -618,7 +618,7 @@
           <a:p>
             <a:fld id="{9AB3A824-1A51-4B26-AD58-A6D8E14F6C04}" type="datetimeFigureOut">
               <a:rPr lang="en-US" smtClean="0"/>
-              <a:t>5/25/21</a:t>
+              <a:t>5/26/21</a:t>
             </a:fld>
             <a:endParaRPr lang="en-US" dirty="0"/>
           </a:p>
@@ -825,7 +825,7 @@
           <a:p>
             <a:fld id="{D857E33E-8B18-4087-B112-809917729534}" type="datetimeFigureOut">
               <a:rPr lang="en-US" smtClean="0"/>
-              <a:t>5/25/21</a:t>
+              <a:t>5/26/21</a:t>
             </a:fld>
             <a:endParaRPr lang="en-US" dirty="0"/>
           </a:p>
@@ -1010,7 +1010,7 @@
           <a:p>
             <a:fld id="{D3FFE419-2371-464F-8239-3959401C3561}" type="datetimeFigureOut">
               <a:rPr lang="en-US" smtClean="0"/>
-              <a:t>5/25/21</a:t>
+              <a:t>5/26/21</a:t>
             </a:fld>
             <a:endParaRPr lang="en-US" dirty="0"/>
           </a:p>
@@ -1185,7 +1185,7 @@
           <a:p>
             <a:fld id="{97D162C4-EDD9-4389-A98B-B87ECEA2A816}" type="datetimeFigureOut">
               <a:rPr lang="en-US" smtClean="0"/>
-              <a:t>5/25/21</a:t>
+              <a:t>5/26/21</a:t>
             </a:fld>
             <a:endParaRPr lang="en-US" dirty="0"/>
           </a:p>
@@ -1770,7 +1770,7 @@
           <a:p>
             <a:fld id="{3E5059C3-6A89-4494-99FF-5A4D6FFD50EB}" type="datetimeFigureOut">
               <a:rPr lang="en-US" smtClean="0"/>
-              <a:t>5/25/21</a:t>
+              <a:t>5/26/21</a:t>
             </a:fld>
             <a:endParaRPr lang="en-US" dirty="0"/>
           </a:p>
@@ -2077,7 +2077,7 @@
           <a:p>
             <a:fld id="{CA954B2F-12DE-47F5-8894-472B206D2E1E}" type="datetimeFigureOut">
               <a:rPr lang="en-US" smtClean="0"/>
-              <a:t>5/25/21</a:t>
+              <a:t>5/26/21</a:t>
             </a:fld>
             <a:endParaRPr lang="en-US" dirty="0"/>
           </a:p>
@@ -2519,7 +2519,7 @@
           <a:p>
             <a:fld id="{3F30E46F-7819-4ACF-B48B-48222C2ACC88}" type="datetimeFigureOut">
               <a:rPr lang="en-US" smtClean="0"/>
-              <a:t>5/25/21</a:t>
+              <a:t>5/26/21</a:t>
             </a:fld>
             <a:endParaRPr lang="en-US" dirty="0"/>
           </a:p>
@@ -2642,7 +2642,7 @@
           <a:p>
             <a:fld id="{1FAF3416-4057-4DAA-829D-4CA07428D088}" type="datetimeFigureOut">
               <a:rPr lang="en-US" smtClean="0"/>
-              <a:t>5/25/21</a:t>
+              <a:t>5/26/21</a:t>
             </a:fld>
             <a:endParaRPr lang="en-US" dirty="0"/>
           </a:p>
@@ -2742,7 +2742,7 @@
           <a:p>
             <a:fld id="{921D9284-D300-4297-87F7-E791DCC15DB1}" type="datetimeFigureOut">
               <a:rPr lang="en-US" smtClean="0"/>
-              <a:t>5/25/21</a:t>
+              <a:t>5/26/21</a:t>
             </a:fld>
             <a:endParaRPr lang="en-US" dirty="0"/>
           </a:p>
@@ -3091,7 +3091,7 @@
           <a:p>
             <a:fld id="{37D525BB-DA17-4BA0-B3C8-3AC3ABC827E6}" type="datetimeFigureOut">
               <a:rPr lang="en-US" smtClean="0"/>
-              <a:t>5/25/21</a:t>
+              <a:t>5/26/21</a:t>
             </a:fld>
             <a:endParaRPr lang="en-US" dirty="0"/>
           </a:p>
@@ -3485,7 +3485,7 @@
           <a:p>
             <a:fld id="{B16C4C9A-3960-41CF-A4E9-2A8FB932454B}" type="datetimeFigureOut">
               <a:rPr lang="en-US" smtClean="0"/>
-              <a:t>5/25/21</a:t>
+              <a:t>5/26/21</a:t>
             </a:fld>
             <a:endParaRPr lang="en-US" dirty="0"/>
           </a:p>
@@ -3798,7 +3798,7 @@
           <a:p>
             <a:fld id="{3CBC1C18-307B-4F68-A007-B5B542270E8D}" type="datetimeFigureOut">
               <a:rPr lang="en-US" smtClean="0"/>
-              <a:t>5/25/21</a:t>
+              <a:t>5/26/21</a:t>
             </a:fld>
             <a:endParaRPr lang="en-US" dirty="0"/>
           </a:p>
@@ -5206,8 +5206,8 @@
           </a:p>
         </p:txBody>
       </p:sp>
-      <mc:AlternateContent xmlns:mc="http://schemas.openxmlformats.org/markup-compatibility/2006">
-        <mc:Choice xmlns:a14="http://schemas.microsoft.com/office/drawing/2010/main" Requires="a14">
+      <mc:AlternateContent xmlns:mc="http://schemas.openxmlformats.org/markup-compatibility/2006" xmlns:a14="http://schemas.microsoft.com/office/drawing/2010/main">
+        <mc:Choice Requires="a14">
           <p:sp>
             <p:nvSpPr>
               <p:cNvPr id="3" name="Content Placeholder 2">
@@ -5473,7 +5473,7 @@
             </p:txBody>
           </p:sp>
         </mc:Choice>
-        <mc:Fallback>
+        <mc:Fallback xmlns="">
           <p:sp>
             <p:nvSpPr>
               <p:cNvPr id="3" name="Content Placeholder 2">

</xml_diff>